<commit_message>
Se modificaron los archivos
</commit_message>
<xml_diff>
--- a/Presentacion_Machine_Learning.pptx
+++ b/Presentacion_Machine_Learning.pptx
@@ -973,7 +973,7 @@
                 </a:schemeClr>
               </a:solidFill>
             </a:rPr>
-            <a:t>Usar solo variables con correlaciones altas mejoraba un poco los resultados. </a:t>
+            <a:t>Usar solo variables con correlaciones altas no mejoraba los resultados. </a:t>
           </a:r>
         </a:p>
       </dgm:t>
@@ -1777,7 +1777,7 @@
                 </a:schemeClr>
               </a:solidFill>
             </a:rPr>
-            <a:t>Usar solo variables con correlaciones altas mejoraba un poco los resultados. </a:t>
+            <a:t>Usar solo variables con correlaciones altas no mejoraba los resultados. </a:t>
           </a:r>
         </a:p>
       </dsp:txBody>
@@ -3152,7 +3152,7 @@
             <a:pPr rtl="0"/>
             <a:fld id="{BE6ADB54-F1AF-44F8-8ED0-867524639FE1}" type="datetimeFigureOut">
               <a:rPr lang="es-ES" smtClean="0"/>
-              <a:t>01/11/2023</a:t>
+              <a:t>02/11/2023</a:t>
             </a:fld>
             <a:endParaRPr lang="es-ES" dirty="0"/>
           </a:p>
@@ -3350,7 +3350,7 @@
             <a:pPr rtl="0"/>
             <a:fld id="{357E5575-CAFE-4A42-A774-E4652BA723C1}" type="datetimeFigureOut">
               <a:rPr lang="es-ES" smtClean="0"/>
-              <a:t>01/11/2023</a:t>
+              <a:t>02/11/2023</a:t>
             </a:fld>
             <a:endParaRPr lang="es-ES" dirty="0"/>
           </a:p>
@@ -19825,7 +19825,7 @@
         </p:blipFill>
         <p:spPr>
           <a:xfrm>
-            <a:off x="2864841" y="3429000"/>
+            <a:off x="2383578" y="3597442"/>
             <a:ext cx="3113392" cy="2755733"/>
           </a:xfrm>
           <a:prstGeom prst="rect">
@@ -19835,10 +19835,10 @@
       </p:pic>
       <p:pic>
         <p:nvPicPr>
-          <p:cNvPr id="10" name="Imagen 9">
+          <p:cNvPr id="8" name="Imagen 7">
             <a:extLst>
               <a:ext uri="{FF2B5EF4-FFF2-40B4-BE49-F238E27FC236}">
-                <a16:creationId xmlns:a16="http://schemas.microsoft.com/office/drawing/2014/main" id="{6A0EFDCA-113C-D88E-F2A0-B6B1577AFDC5}"/>
+                <a16:creationId xmlns:a16="http://schemas.microsoft.com/office/drawing/2014/main" id="{CC486BC9-8263-01BE-66C5-5DCBA0B6882B}"/>
               </a:ext>
             </a:extLst>
           </p:cNvPr>
@@ -19855,8 +19855,8 @@
         </p:blipFill>
         <p:spPr>
           <a:xfrm>
-            <a:off x="5948363" y="1507958"/>
-            <a:ext cx="5910210" cy="4676775"/>
+            <a:off x="5496969" y="1416600"/>
+            <a:ext cx="6395973" cy="4936575"/>
           </a:xfrm>
           <a:prstGeom prst="rect">
             <a:avLst/>
@@ -25235,6 +25235,127 @@
       </p:grpSpPr>
       <p:sp>
         <p:nvSpPr>
+          <p:cNvPr id="2" name="Título 1">
+            <a:extLst>
+              <a:ext uri="{FF2B5EF4-FFF2-40B4-BE49-F238E27FC236}">
+                <a16:creationId xmlns:a16="http://schemas.microsoft.com/office/drawing/2014/main" id="{EB568DB7-F461-F0D4-10DB-9135287FE01F}"/>
+              </a:ext>
+            </a:extLst>
+          </p:cNvPr>
+          <p:cNvSpPr>
+            <a:spLocks noGrp="1"/>
+          </p:cNvSpPr>
+          <p:nvPr>
+            <p:ph type="title"/>
+          </p:nvPr>
+        </p:nvSpPr>
+        <p:spPr/>
+        <p:txBody>
+          <a:bodyPr/>
+          <a:lstStyle/>
+          <a:p>
+            <a:r>
+              <a:rPr lang="es-CO" dirty="0">
+                <a:solidFill>
+                  <a:schemeClr val="bg1">
+                    <a:lumMod val="85000"/>
+                  </a:schemeClr>
+                </a:solidFill>
+              </a:rPr>
+              <a:t>Conclusiones </a:t>
+            </a:r>
+          </a:p>
+        </p:txBody>
+      </p:sp>
+      <p:sp>
+        <p:nvSpPr>
+          <p:cNvPr id="4" name="Marcador de texto 3">
+            <a:extLst>
+              <a:ext uri="{FF2B5EF4-FFF2-40B4-BE49-F238E27FC236}">
+                <a16:creationId xmlns:a16="http://schemas.microsoft.com/office/drawing/2014/main" id="{B34CCAF0-A71A-CCA4-096B-38BE336DF4B1}"/>
+              </a:ext>
+            </a:extLst>
+          </p:cNvPr>
+          <p:cNvSpPr>
+            <a:spLocks noGrp="1"/>
+          </p:cNvSpPr>
+          <p:nvPr>
+            <p:ph type="body" sz="quarter" idx="15"/>
+          </p:nvPr>
+        </p:nvSpPr>
+        <p:spPr/>
+        <p:txBody>
+          <a:bodyPr/>
+          <a:lstStyle/>
+          <a:p>
+            <a:r>
+              <a:rPr lang="en-US" dirty="0"/>
+              <a:t>1</a:t>
+            </a:r>
+            <a:endParaRPr lang="es-ES" dirty="0"/>
+          </a:p>
+        </p:txBody>
+      </p:sp>
+      <p:sp>
+        <p:nvSpPr>
+          <p:cNvPr id="5" name="Marcador de texto 4">
+            <a:extLst>
+              <a:ext uri="{FF2B5EF4-FFF2-40B4-BE49-F238E27FC236}">
+                <a16:creationId xmlns:a16="http://schemas.microsoft.com/office/drawing/2014/main" id="{929C0DE8-B7F2-0F43-D9AB-2FDC7B3E6A58}"/>
+              </a:ext>
+            </a:extLst>
+          </p:cNvPr>
+          <p:cNvSpPr>
+            <a:spLocks noGrp="1"/>
+          </p:cNvSpPr>
+          <p:nvPr>
+            <p:ph type="body" sz="quarter" idx="16"/>
+          </p:nvPr>
+        </p:nvSpPr>
+        <p:spPr/>
+        <p:txBody>
+          <a:bodyPr/>
+          <a:lstStyle/>
+          <a:p>
+            <a:r>
+              <a:rPr lang="en-US" dirty="0"/>
+              <a:t>1</a:t>
+            </a:r>
+            <a:endParaRPr lang="es-ES" dirty="0"/>
+          </a:p>
+        </p:txBody>
+      </p:sp>
+      <p:sp>
+        <p:nvSpPr>
+          <p:cNvPr id="6" name="Marcador de texto 5">
+            <a:extLst>
+              <a:ext uri="{FF2B5EF4-FFF2-40B4-BE49-F238E27FC236}">
+                <a16:creationId xmlns:a16="http://schemas.microsoft.com/office/drawing/2014/main" id="{2D9CD6CC-114A-3680-54A9-5E0EAB010711}"/>
+              </a:ext>
+            </a:extLst>
+          </p:cNvPr>
+          <p:cNvSpPr>
+            <a:spLocks noGrp="1"/>
+          </p:cNvSpPr>
+          <p:nvPr>
+            <p:ph type="body" sz="quarter" idx="17"/>
+          </p:nvPr>
+        </p:nvSpPr>
+        <p:spPr/>
+        <p:txBody>
+          <a:bodyPr/>
+          <a:lstStyle/>
+          <a:p>
+            <a:r>
+              <a:rPr lang="en-US" dirty="0"/>
+              <a:t>1</a:t>
+            </a:r>
+            <a:endParaRPr lang="es-ES" dirty="0"/>
+          </a:p>
+        </p:txBody>
+      </p:sp>
+      <p:sp>
+        <p:nvSpPr>
           <p:cNvPr id="7" name="CuadroTexto 6">
             <a:extLst>
               <a:ext uri="{FF2B5EF4-FFF2-40B4-BE49-F238E27FC236}">
@@ -25558,127 +25679,6 @@
               </a:rPr>
               <a:t> </a:t>
             </a:r>
-          </a:p>
-        </p:txBody>
-      </p:sp>
-      <p:sp>
-        <p:nvSpPr>
-          <p:cNvPr id="2" name="Título 1">
-            <a:extLst>
-              <a:ext uri="{FF2B5EF4-FFF2-40B4-BE49-F238E27FC236}">
-                <a16:creationId xmlns:a16="http://schemas.microsoft.com/office/drawing/2014/main" id="{EB568DB7-F461-F0D4-10DB-9135287FE01F}"/>
-              </a:ext>
-            </a:extLst>
-          </p:cNvPr>
-          <p:cNvSpPr>
-            <a:spLocks noGrp="1"/>
-          </p:cNvSpPr>
-          <p:nvPr>
-            <p:ph type="title"/>
-          </p:nvPr>
-        </p:nvSpPr>
-        <p:spPr/>
-        <p:txBody>
-          <a:bodyPr/>
-          <a:lstStyle/>
-          <a:p>
-            <a:r>
-              <a:rPr lang="es-CO" dirty="0">
-                <a:solidFill>
-                  <a:schemeClr val="bg1">
-                    <a:lumMod val="85000"/>
-                  </a:schemeClr>
-                </a:solidFill>
-              </a:rPr>
-              <a:t>Conclusiones </a:t>
-            </a:r>
-          </a:p>
-        </p:txBody>
-      </p:sp>
-      <p:sp>
-        <p:nvSpPr>
-          <p:cNvPr id="4" name="Marcador de texto 3">
-            <a:extLst>
-              <a:ext uri="{FF2B5EF4-FFF2-40B4-BE49-F238E27FC236}">
-                <a16:creationId xmlns:a16="http://schemas.microsoft.com/office/drawing/2014/main" id="{B34CCAF0-A71A-CCA4-096B-38BE336DF4B1}"/>
-              </a:ext>
-            </a:extLst>
-          </p:cNvPr>
-          <p:cNvSpPr>
-            <a:spLocks noGrp="1"/>
-          </p:cNvSpPr>
-          <p:nvPr>
-            <p:ph type="body" sz="quarter" idx="15"/>
-          </p:nvPr>
-        </p:nvSpPr>
-        <p:spPr/>
-        <p:txBody>
-          <a:bodyPr/>
-          <a:lstStyle/>
-          <a:p>
-            <a:r>
-              <a:rPr lang="en-US" dirty="0"/>
-              <a:t>1</a:t>
-            </a:r>
-            <a:endParaRPr lang="es-ES" dirty="0"/>
-          </a:p>
-        </p:txBody>
-      </p:sp>
-      <p:sp>
-        <p:nvSpPr>
-          <p:cNvPr id="5" name="Marcador de texto 4">
-            <a:extLst>
-              <a:ext uri="{FF2B5EF4-FFF2-40B4-BE49-F238E27FC236}">
-                <a16:creationId xmlns:a16="http://schemas.microsoft.com/office/drawing/2014/main" id="{929C0DE8-B7F2-0F43-D9AB-2FDC7B3E6A58}"/>
-              </a:ext>
-            </a:extLst>
-          </p:cNvPr>
-          <p:cNvSpPr>
-            <a:spLocks noGrp="1"/>
-          </p:cNvSpPr>
-          <p:nvPr>
-            <p:ph type="body" sz="quarter" idx="16"/>
-          </p:nvPr>
-        </p:nvSpPr>
-        <p:spPr/>
-        <p:txBody>
-          <a:bodyPr/>
-          <a:lstStyle/>
-          <a:p>
-            <a:r>
-              <a:rPr lang="en-US" dirty="0"/>
-              <a:t>1</a:t>
-            </a:r>
-            <a:endParaRPr lang="es-ES" dirty="0"/>
-          </a:p>
-        </p:txBody>
-      </p:sp>
-      <p:sp>
-        <p:nvSpPr>
-          <p:cNvPr id="6" name="Marcador de texto 5">
-            <a:extLst>
-              <a:ext uri="{FF2B5EF4-FFF2-40B4-BE49-F238E27FC236}">
-                <a16:creationId xmlns:a16="http://schemas.microsoft.com/office/drawing/2014/main" id="{2D9CD6CC-114A-3680-54A9-5E0EAB010711}"/>
-              </a:ext>
-            </a:extLst>
-          </p:cNvPr>
-          <p:cNvSpPr>
-            <a:spLocks noGrp="1"/>
-          </p:cNvSpPr>
-          <p:nvPr>
-            <p:ph type="body" sz="quarter" idx="17"/>
-          </p:nvPr>
-        </p:nvSpPr>
-        <p:spPr/>
-        <p:txBody>
-          <a:bodyPr/>
-          <a:lstStyle/>
-          <a:p>
-            <a:r>
-              <a:rPr lang="en-US" dirty="0"/>
-              <a:t>1</a:t>
-            </a:r>
-            <a:endParaRPr lang="es-ES" dirty="0"/>
           </a:p>
         </p:txBody>
       </p:sp>
@@ -27194,7 +27194,7 @@
             <p:ph type="dgm" sz="quarter" idx="10"/>
             <p:extLst>
               <p:ext uri="{D42A27DB-BD31-4B8C-83A1-F6EECF244321}">
-                <p14:modId xmlns:p14="http://schemas.microsoft.com/office/powerpoint/2010/main" val="4168000085"/>
+                <p14:modId xmlns:p14="http://schemas.microsoft.com/office/powerpoint/2010/main" val="1183635146"/>
               </p:ext>
             </p:extLst>
           </p:nvPr>
@@ -29793,6 +29793,15 @@
 </file>
 
 <file path=customXml/item1.xml><?xml version="1.0" encoding="utf-8"?>
+<?mso-contentType ?>
+<FormTemplates xmlns="http://schemas.microsoft.com/sharepoint/v3/contenttype/forms">
+  <Display>DocumentLibraryForm</Display>
+  <Edit>DocumentLibraryForm</Edit>
+  <New>DocumentLibraryForm</New>
+</FormTemplates>
+</file>
+
+<file path=customXml/item2.xml><?xml version="1.0" encoding="utf-8"?>
 <ct:contentTypeSchema xmlns:ct="http://schemas.microsoft.com/office/2006/metadata/contentType" xmlns:ma="http://schemas.microsoft.com/office/2006/metadata/properties/metaAttributes" ct:_="" ma:_="" ma:contentTypeName="Document" ma:contentTypeID="0x01010079F111ED35F8CC479449609E8A0923A6" ma:contentTypeVersion="26" ma:contentTypeDescription="Create a new document." ma:contentTypeScope="" ma:versionID="ac37c1753acd5e330d2062ccec26ea66">
   <xsd:schema xmlns:xsd="http://www.w3.org/2001/XMLSchema" xmlns:xs="http://www.w3.org/2001/XMLSchema" xmlns:p="http://schemas.microsoft.com/office/2006/metadata/properties" xmlns:ns1="http://schemas.microsoft.com/sharepoint/v3" xmlns:ns2="71af3243-3dd4-4a8d-8c0d-dd76da1f02a5" xmlns:ns3="16c05727-aa75-4e4a-9b5f-8a80a1165891" xmlns:ns4="230e9df3-be65-4c73-a93b-d1236ebd677e" targetNamespace="http://schemas.microsoft.com/office/2006/metadata/properties" ma:root="true" ma:fieldsID="3b340c7101c92c5120abd06486f94548" ns1:_="" ns2:_="" ns3:_="" ns4:_="">
     <xsd:import namespace="http://schemas.microsoft.com/sharepoint/v3"/>
@@ -30092,15 +30101,6 @@
 </ct:contentTypeSchema>
 </file>
 
-<file path=customXml/item2.xml><?xml version="1.0" encoding="utf-8"?>
-<?mso-contentType ?>
-<FormTemplates xmlns="http://schemas.microsoft.com/sharepoint/v3/contenttype/forms">
-  <Display>DocumentLibraryForm</Display>
-  <Edit>DocumentLibraryForm</Edit>
-  <New>DocumentLibraryForm</New>
-</FormTemplates>
-</file>
-
 <file path=customXml/item3.xml><?xml version="1.0" encoding="utf-8"?>
 <p:properties xmlns:p="http://schemas.microsoft.com/office/2006/metadata/properties" xmlns:xsi="http://www.w3.org/2001/XMLSchema-instance" xmlns:pc="http://schemas.microsoft.com/office/infopath/2007/PartnerControls">
   <documentManagement>
@@ -30122,6 +30122,14 @@
 </file>
 
 <file path=customXml/itemProps1.xml><?xml version="1.0" encoding="utf-8"?>
+<ds:datastoreItem xmlns:ds="http://schemas.openxmlformats.org/officeDocument/2006/customXml" ds:itemID="{017748DE-D1CF-4B15-AE74-C1B32FB82261}">
+  <ds:schemaRefs>
+    <ds:schemaRef ds:uri="http://schemas.microsoft.com/sharepoint/v3/contenttype/forms"/>
+  </ds:schemaRefs>
+</ds:datastoreItem>
+</file>
+
+<file path=customXml/itemProps2.xml><?xml version="1.0" encoding="utf-8"?>
 <ds:datastoreItem xmlns:ds="http://schemas.openxmlformats.org/officeDocument/2006/customXml" ds:itemID="{681DA0BA-EC0A-451C-A13D-96E558F52229}">
   <ds:schemaRefs>
     <ds:schemaRef ds:uri="http://schemas.microsoft.com/office/2006/metadata/contentType"/>
@@ -30142,14 +30150,6 @@
 </ds:datastoreItem>
 </file>
 
-<file path=customXml/itemProps2.xml><?xml version="1.0" encoding="utf-8"?>
-<ds:datastoreItem xmlns:ds="http://schemas.openxmlformats.org/officeDocument/2006/customXml" ds:itemID="{017748DE-D1CF-4B15-AE74-C1B32FB82261}">
-  <ds:schemaRefs>
-    <ds:schemaRef ds:uri="http://schemas.microsoft.com/sharepoint/v3/contenttype/forms"/>
-  </ds:schemaRefs>
-</ds:datastoreItem>
-</file>
-
 <file path=customXml/itemProps3.xml><?xml version="1.0" encoding="utf-8"?>
 <ds:datastoreItem xmlns:ds="http://schemas.openxmlformats.org/officeDocument/2006/customXml" ds:itemID="{93E00486-CB92-4A36-912A-95D11F2FF948}">
   <ds:schemaRefs>

</xml_diff>

<commit_message>
Se modifico la presentacion
</commit_message>
<xml_diff>
--- a/Presentacion_Machine_Learning.pptx
+++ b/Presentacion_Machine_Learning.pptx
@@ -25283,14 +25283,19 @@
             <p:ph type="body" sz="quarter" idx="15"/>
           </p:nvPr>
         </p:nvSpPr>
-        <p:spPr/>
+        <p:spPr>
+          <a:xfrm>
+            <a:off x="2864841" y="1729157"/>
+            <a:ext cx="937138" cy="685800"/>
+          </a:xfrm>
+        </p:spPr>
         <p:txBody>
           <a:bodyPr/>
           <a:lstStyle/>
           <a:p>
             <a:r>
               <a:rPr lang="en-US" dirty="0"/>
-              <a:t>1</a:t>
+              <a:t>18</a:t>
             </a:r>
             <a:endParaRPr lang="es-ES" dirty="0"/>
           </a:p>
@@ -25312,14 +25317,19 @@
             <p:ph type="body" sz="quarter" idx="16"/>
           </p:nvPr>
         </p:nvSpPr>
-        <p:spPr/>
+        <p:spPr>
+          <a:xfrm>
+            <a:off x="2886612" y="3439886"/>
+            <a:ext cx="937138" cy="685800"/>
+          </a:xfrm>
+        </p:spPr>
         <p:txBody>
           <a:bodyPr/>
           <a:lstStyle/>
           <a:p>
             <a:r>
               <a:rPr lang="en-US" dirty="0"/>
-              <a:t>1</a:t>
+              <a:t>18</a:t>
             </a:r>
             <a:endParaRPr lang="es-ES" dirty="0"/>
           </a:p>
@@ -25341,14 +25351,19 @@
             <p:ph type="body" sz="quarter" idx="17"/>
           </p:nvPr>
         </p:nvSpPr>
-        <p:spPr/>
+        <p:spPr>
+          <a:xfrm>
+            <a:off x="2867511" y="5128843"/>
+            <a:ext cx="937138" cy="685800"/>
+          </a:xfrm>
+        </p:spPr>
         <p:txBody>
           <a:bodyPr/>
           <a:lstStyle/>
           <a:p>
             <a:r>
               <a:rPr lang="en-US" dirty="0"/>
-              <a:t>1</a:t>
+              <a:t>18</a:t>
             </a:r>
             <a:endParaRPr lang="es-ES" dirty="0"/>
           </a:p>
@@ -25432,7 +25447,27 @@
                   </a:schemeClr>
                 </a:solidFill>
               </a:rPr>
-              <a:t>Los buenos resultados de unos modelos pueden depender de la alta cantidad de datos.</a:t>
+              <a:t>Se puede utilizar una Regresión Logística con un </a:t>
+            </a:r>
+            <a:r>
+              <a:rPr lang="es-CO" dirty="0" err="1">
+                <a:solidFill>
+                  <a:schemeClr val="bg1">
+                    <a:lumMod val="85000"/>
+                  </a:schemeClr>
+                </a:solidFill>
+              </a:rPr>
+              <a:t>threshold</a:t>
+            </a:r>
+            <a:r>
+              <a:rPr lang="es-CO" dirty="0">
+                <a:solidFill>
+                  <a:schemeClr val="bg1">
+                    <a:lumMod val="85000"/>
+                  </a:schemeClr>
+                </a:solidFill>
+              </a:rPr>
+              <a:t> de 0.36 para tener una idea rápida de los resultados.</a:t>
             </a:r>
           </a:p>
           <a:p>
@@ -25453,27 +25488,7 @@
                   </a:schemeClr>
                 </a:solidFill>
               </a:rPr>
-              <a:t>Se puede utilizar una Regresión Logística con un </a:t>
-            </a:r>
-            <a:r>
-              <a:rPr lang="es-CO" dirty="0" err="1">
-                <a:solidFill>
-                  <a:schemeClr val="bg1">
-                    <a:lumMod val="85000"/>
-                  </a:schemeClr>
-                </a:solidFill>
-              </a:rPr>
-              <a:t>threshold</a:t>
-            </a:r>
-            <a:r>
-              <a:rPr lang="es-CO" dirty="0">
-                <a:solidFill>
-                  <a:schemeClr val="bg1">
-                    <a:lumMod val="85000"/>
-                  </a:schemeClr>
-                </a:solidFill>
-              </a:rPr>
-              <a:t> de 0.36 para tener una idea rápida de los resultados.</a:t>
+              <a:t>Los buenos resultados de unos modelos pueden depender de la alta cantidad de datos.</a:t>
             </a:r>
             <a:br>
               <a:rPr lang="es-CO" dirty="0">

</xml_diff>